<commit_message>
update with scoped package and update testchain
</commit_message>
<xml_diff>
--- a/pfp14-swtclib.pptx
+++ b/pfp14-swtclib.pptx
@@ -232,7 +232,7 @@
           <a:p>
             <a:fld id="{CCF8F8B4-FA37-AC4B-8236-5DFE66AE3838}" type="datetimeFigureOut">
               <a:rPr kumimoji="1" lang="zh-CN" altLang="en-US" smtClean="0"/>
-              <a:t>2019/9/11</a:t>
+              <a:t>2020/2/2</a:t>
             </a:fld>
             <a:endParaRPr kumimoji="1" lang="zh-CN" altLang="en-US"/>
           </a:p>
@@ -2446,163 +2446,171 @@
           <a:p>
             <a:pPr algn="l"/>
             <a:r>
-              <a:rPr lang="zh-CN" altLang="en-US" sz="1600"/>
+              <a:rPr lang="zh-CN" altLang="en-US" sz="1600" dirty="0"/>
               <a:t>var jlib = require('jingtum-lib');</a:t>
             </a:r>
           </a:p>
           <a:p>
             <a:pPr algn="l"/>
             <a:r>
-              <a:rPr lang="zh-CN" altLang="en-US" sz="1600"/>
+              <a:rPr lang="zh-CN" altLang="en-US" sz="1600" dirty="0"/>
               <a:t>var Remote = jlib.Remote;</a:t>
             </a:r>
           </a:p>
           <a:p>
             <a:pPr algn="l"/>
             <a:r>
-              <a:rPr lang="zh-CN" altLang="en-US" sz="1600"/>
-              <a:t>var remote = new Remote({server: 'ws://ts5.jingtum.com:5020'});</a:t>
-            </a:r>
-          </a:p>
-          <a:p>
-            <a:pPr algn="l"/>
-            <a:r>
-              <a:rPr lang="zh-CN" altLang="en-US" sz="1600"/>
+              <a:rPr lang="zh-CN" altLang="en-US" sz="1600" dirty="0"/>
+              <a:t>var remote = new Remote({server: 'ws://ts5.jingtum.com:50</a:t>
+            </a:r>
+            <a:r>
+              <a:rPr lang="en-US" altLang="zh-CN" sz="1600" dirty="0"/>
+              <a:t>3</a:t>
+            </a:r>
+            <a:r>
+              <a:rPr lang="zh-CN" altLang="en-US" sz="1600" dirty="0"/>
+              <a:t>0'});</a:t>
+            </a:r>
+          </a:p>
+          <a:p>
+            <a:pPr algn="l"/>
+            <a:r>
+              <a:rPr lang="zh-CN" altLang="en-US" sz="1600" dirty="0"/>
               <a:t>remote.connect(function (err, result) {</a:t>
             </a:r>
           </a:p>
           <a:p>
             <a:pPr algn="l"/>
             <a:r>
-              <a:rPr lang="zh-CN" altLang="en-US" sz="1600"/>
+              <a:rPr lang="zh-CN" altLang="en-US" sz="1600" dirty="0"/>
               <a:t>    if (err) {</a:t>
             </a:r>
           </a:p>
           <a:p>
             <a:pPr algn="l"/>
             <a:r>
-              <a:rPr lang="zh-CN" altLang="en-US" sz="1600"/>
+              <a:rPr lang="zh-CN" altLang="en-US" sz="1600" dirty="0"/>
               <a:t>        console.log('err:', err);</a:t>
             </a:r>
           </a:p>
           <a:p>
             <a:pPr algn="l"/>
             <a:r>
-              <a:rPr lang="zh-CN" altLang="en-US" sz="1600"/>
+              <a:rPr lang="zh-CN" altLang="en-US" sz="1600" dirty="0"/>
               <a:t>    } else {</a:t>
             </a:r>
           </a:p>
           <a:p>
             <a:pPr algn="l"/>
             <a:r>
-              <a:rPr lang="zh-CN" altLang="en-US" sz="1600"/>
+              <a:rPr lang="zh-CN" altLang="en-US" sz="1600" dirty="0"/>
               <a:t>        var req =</a:t>
             </a:r>
             <a:r>
-              <a:rPr lang="zh-CN" altLang="en-US" sz="1600" b="1"/>
+              <a:rPr lang="zh-CN" altLang="en-US" sz="1600" b="1" dirty="0"/>
               <a:t> remote.requestLedger({</a:t>
             </a:r>
           </a:p>
           <a:p>
             <a:pPr algn="l"/>
             <a:r>
-              <a:rPr lang="zh-CN" altLang="en-US" sz="1600" b="1"/>
+              <a:rPr lang="zh-CN" altLang="en-US" sz="1600" b="1" dirty="0"/>
               <a:t>        ledger_index: 3637979, </a:t>
             </a:r>
           </a:p>
           <a:p>
             <a:pPr algn="l"/>
             <a:r>
-              <a:rPr lang="zh-CN" altLang="en-US" sz="1600" b="1"/>
+              <a:rPr lang="zh-CN" altLang="en-US" sz="1600" b="1" dirty="0"/>
               <a:t>        transactions: true </a:t>
             </a:r>
           </a:p>
           <a:p>
             <a:pPr algn="l"/>
             <a:r>
-              <a:rPr lang="zh-CN" altLang="en-US" sz="1600" b="1"/>
+              <a:rPr lang="zh-CN" altLang="en-US" sz="1600" b="1" dirty="0"/>
               <a:t>    });</a:t>
             </a:r>
-            <a:endParaRPr lang="zh-CN" altLang="en-US" sz="1600"/>
-          </a:p>
-          <a:p>
-            <a:pPr algn="l"/>
-            <a:r>
-              <a:rPr lang="zh-CN" altLang="en-US" sz="1600"/>
+            <a:endParaRPr lang="zh-CN" altLang="en-US" sz="1600" dirty="0"/>
+          </a:p>
+          <a:p>
+            <a:pPr algn="l"/>
+            <a:r>
+              <a:rPr lang="zh-CN" altLang="en-US" sz="1600" dirty="0"/>
               <a:t>        req.submit(function (err, result) {</a:t>
             </a:r>
           </a:p>
           <a:p>
             <a:pPr algn="l"/>
             <a:r>
-              <a:rPr lang="zh-CN" altLang="en-US" sz="1600"/>
+              <a:rPr lang="zh-CN" altLang="en-US" sz="1600" dirty="0"/>
               <a:t>            if (err) {</a:t>
             </a:r>
           </a:p>
           <a:p>
             <a:pPr algn="l"/>
             <a:r>
-              <a:rPr lang="zh-CN" altLang="en-US" sz="1600"/>
+              <a:rPr lang="zh-CN" altLang="en-US" sz="1600" dirty="0"/>
               <a:t>                console.log('err:', err);</a:t>
             </a:r>
           </a:p>
           <a:p>
             <a:pPr algn="l"/>
             <a:r>
-              <a:rPr lang="zh-CN" altLang="en-US" sz="1600"/>
+              <a:rPr lang="zh-CN" altLang="en-US" sz="1600" dirty="0"/>
               <a:t>            }</a:t>
             </a:r>
           </a:p>
           <a:p>
             <a:pPr algn="l"/>
             <a:r>
-              <a:rPr lang="zh-CN" altLang="en-US" sz="1600"/>
+              <a:rPr lang="zh-CN" altLang="en-US" sz="1600" dirty="0"/>
               <a:t>            else {</a:t>
             </a:r>
           </a:p>
           <a:p>
             <a:pPr algn="l"/>
             <a:r>
-              <a:rPr lang="zh-CN" altLang="en-US" sz="1600"/>
+              <a:rPr lang="zh-CN" altLang="en-US" sz="1600" dirty="0"/>
               <a:t>                console.log(result);</a:t>
             </a:r>
           </a:p>
           <a:p>
             <a:pPr algn="l"/>
             <a:r>
-              <a:rPr lang="zh-CN" altLang="en-US" sz="1600"/>
+              <a:rPr lang="zh-CN" altLang="en-US" sz="1600" dirty="0"/>
               <a:t>            }</a:t>
             </a:r>
           </a:p>
           <a:p>
             <a:pPr algn="l"/>
             <a:r>
-              <a:rPr lang="zh-CN" altLang="en-US" sz="1600"/>
+              <a:rPr lang="zh-CN" altLang="en-US" sz="1600" dirty="0"/>
               <a:t>        });</a:t>
             </a:r>
           </a:p>
           <a:p>
             <a:pPr algn="l"/>
             <a:r>
-              <a:rPr lang="zh-CN" altLang="en-US" sz="1600"/>
+              <a:rPr lang="zh-CN" altLang="en-US" sz="1600" dirty="0"/>
               <a:t>    }</a:t>
             </a:r>
           </a:p>
           <a:p>
             <a:pPr algn="l"/>
             <a:r>
-              <a:rPr lang="zh-CN" altLang="en-US" sz="1600"/>
+              <a:rPr lang="zh-CN" altLang="en-US" sz="1600" dirty="0"/>
               <a:t>});</a:t>
             </a:r>
           </a:p>
           <a:p>
             <a:pPr algn="l"/>
-            <a:endParaRPr lang="zh-CN" altLang="en-US" sz="1600"/>
-          </a:p>
-          <a:p>
-            <a:pPr algn="l"/>
-            <a:r>
-              <a:rPr lang="en-US" altLang="zh-CN" sz="1600"/>
+            <a:endParaRPr lang="zh-CN" altLang="en-US" sz="1600" dirty="0"/>
+          </a:p>
+          <a:p>
+            <a:pPr algn="l"/>
+            <a:r>
+              <a:rPr lang="en-US" altLang="zh-CN" sz="1600" dirty="0"/>
               <a:t>	</a:t>
             </a:r>
           </a:p>
@@ -3097,6 +3105,10 @@
               <a:t>var jlib = require('</a:t>
             </a:r>
             <a:r>
+              <a:rPr lang="en-US" altLang="zh-CN" sz="1600" dirty="0"/>
+              <a:t>@</a:t>
+            </a:r>
+            <a:r>
               <a:rPr lang="en-US" altLang="zh-CN" sz="1600" dirty="0">
                 <a:solidFill>
                   <a:srgbClr val="FF0000"/>
@@ -3126,7 +3138,7 @@
                   <a:srgbClr val="FF0000"/>
                 </a:solidFill>
               </a:rPr>
-              <a:t>-lib</a:t>
+              <a:t>/lib</a:t>
             </a:r>
             <a:r>
               <a:rPr lang="zh-CN" altLang="en-US" sz="1600" dirty="0"/>
@@ -3149,7 +3161,15 @@
             <a:pPr algn="l"/>
             <a:r>
               <a:rPr lang="zh-CN" altLang="en-US" sz="1600" dirty="0"/>
-              <a:t>var remote = new Remote({server: 'ws://ts5.jingtum.com:5020'});</a:t>
+              <a:t>var remote = new Remote({server: 'ws://ts5.jingtum.com:50</a:t>
+            </a:r>
+            <a:r>
+              <a:rPr lang="en-US" altLang="zh-CN" sz="1600" dirty="0"/>
+              <a:t>3</a:t>
+            </a:r>
+            <a:r>
+              <a:rPr lang="zh-CN" altLang="en-US" sz="1600" dirty="0"/>
+              <a:t>0'});</a:t>
             </a:r>
           </a:p>
           <a:p>
@@ -3438,7 +3458,7 @@
             </a:r>
             <a:r>
               <a:rPr lang="en-US" altLang="zh-CN" b="1" dirty="0"/>
-              <a:t> - </a:t>
+              <a:t> - @</a:t>
             </a:r>
             <a:r>
               <a:rPr lang="en-US" altLang="zh-CN" b="1" dirty="0" err="1">
@@ -3449,8 +3469,16 @@
               <a:t>swtc</a:t>
             </a:r>
             <a:r>
+              <a:rPr lang="en-US" altLang="zh-CN" b="1" dirty="0">
+                <a:solidFill>
+                  <a:srgbClr val="FF0000"/>
+                </a:solidFill>
+              </a:rPr>
+              <a:t>/</a:t>
+            </a:r>
+            <a:r>
               <a:rPr lang="en-US" altLang="zh-CN" b="1" dirty="0"/>
-              <a:t>-lib</a:t>
+              <a:t>lib</a:t>
             </a:r>
             <a:endParaRPr lang="zh-CN" altLang="en-US" b="1" dirty="0"/>
           </a:p>
@@ -3916,12 +3944,20 @@
               <a:t>var jlib = require('</a:t>
             </a:r>
             <a:r>
+              <a:rPr lang="en-US" altLang="zh-CN" sz="1600" dirty="0"/>
+              <a:t>@</a:t>
+            </a:r>
+            <a:r>
               <a:rPr lang="en-US" altLang="zh-CN" sz="1600" dirty="0" err="1"/>
               <a:t>swtc</a:t>
             </a:r>
             <a:r>
+              <a:rPr lang="en-US" altLang="zh-CN" sz="1600" dirty="0"/>
+              <a:t>/</a:t>
+            </a:r>
+            <a:r>
               <a:rPr lang="zh-CN" altLang="en-US" sz="1600" dirty="0"/>
-              <a:t>-lib');</a:t>
+              <a:t>lib');</a:t>
             </a:r>
           </a:p>
           <a:p>
@@ -4715,7 +4751,15 @@
             <a:pPr algn="l"/>
             <a:r>
               <a:rPr lang="zh-CN" altLang="en-US" sz="1400" dirty="0"/>
-              <a:t>var remote = new Remote({server: 'ws://ts5.jingtum.com:5020', </a:t>
+              <a:t>var remote = new Remote({server: 'ws://ts5.jingtum.com:50</a:t>
+            </a:r>
+            <a:r>
+              <a:rPr lang="en-US" altLang="zh-CN" sz="1400" dirty="0"/>
+              <a:t>3</a:t>
+            </a:r>
+            <a:r>
+              <a:rPr lang="zh-CN" altLang="en-US" sz="1400" dirty="0"/>
+              <a:t>0', </a:t>
             </a:r>
           </a:p>
           <a:p>
@@ -5365,7 +5409,7 @@
             </a:r>
             <a:r>
               <a:rPr lang="en-US" altLang="zh-CN" b="1" dirty="0"/>
-              <a:t> – </a:t>
+              <a:t> – @</a:t>
             </a:r>
             <a:r>
               <a:rPr lang="en-US" altLang="zh-CN" b="1" dirty="0" err="1">
@@ -5381,7 +5425,7 @@
                   <a:srgbClr val="FF0000"/>
                 </a:solidFill>
               </a:rPr>
-              <a:t>-lib</a:t>
+              <a:t>/lib</a:t>
             </a:r>
             <a:endParaRPr lang="zh-CN" altLang="en-US" b="1" dirty="0">
               <a:solidFill>
@@ -5418,6 +5462,10 @@
               <a:t>var jlib = require('</a:t>
             </a:r>
             <a:r>
+              <a:rPr lang="en-US" altLang="zh-CN" sz="1400" dirty="0"/>
+              <a:t>@</a:t>
+            </a:r>
+            <a:r>
               <a:rPr lang="en-US" altLang="zh-CN" sz="1400" dirty="0" err="1">
                 <a:solidFill>
                   <a:srgbClr val="FF0000"/>
@@ -5426,12 +5474,20 @@
               <a:t>swtc</a:t>
             </a:r>
             <a:r>
+              <a:rPr lang="en-US" altLang="zh-CN" sz="1400" dirty="0">
+                <a:solidFill>
+                  <a:srgbClr val="FF0000"/>
+                </a:solidFill>
+              </a:rPr>
+              <a:t>/</a:t>
+            </a:r>
+            <a:r>
               <a:rPr lang="zh-CN" altLang="en-US" sz="1400" dirty="0">
                 <a:solidFill>
                   <a:srgbClr val="FF0000"/>
                 </a:solidFill>
               </a:rPr>
-              <a:t>-lib</a:t>
+              <a:t>lib</a:t>
             </a:r>
             <a:r>
               <a:rPr lang="zh-CN" altLang="en-US" sz="1400" dirty="0"/>
@@ -5457,7 +5513,23 @@
                   <a:srgbClr val="FF0000"/>
                 </a:solidFill>
               </a:rPr>
-              <a:t>server: 'ws://ts5.jingtum.com:5020'</a:t>
+              <a:t>server: 'ws://ts5.jingtum.com:50</a:t>
+            </a:r>
+            <a:r>
+              <a:rPr lang="en-US" altLang="zh-CN" sz="1400" dirty="0">
+                <a:solidFill>
+                  <a:srgbClr val="FF0000"/>
+                </a:solidFill>
+              </a:rPr>
+              <a:t>3</a:t>
+            </a:r>
+            <a:r>
+              <a:rPr lang="zh-CN" altLang="en-US" sz="1400" dirty="0">
+                <a:solidFill>
+                  <a:srgbClr val="FF0000"/>
+                </a:solidFill>
+              </a:rPr>
+              <a:t>0'</a:t>
             </a:r>
             <a:r>
               <a:rPr lang="zh-CN" altLang="en-US" sz="1400" dirty="0"/>
@@ -6637,12 +6709,16 @@
               <a:t>，为啥还有</a:t>
             </a:r>
             <a:r>
+              <a:rPr lang="en-US" altLang="zh-CN" sz="2800" dirty="0"/>
+              <a:t>@</a:t>
+            </a:r>
+            <a:r>
               <a:rPr lang="en-US" altLang="zh-CN" sz="2800" dirty="0" err="1"/>
               <a:t>swtc</a:t>
             </a:r>
             <a:r>
               <a:rPr lang="en-US" altLang="zh-CN" sz="2800" dirty="0"/>
-              <a:t>-lib</a:t>
+              <a:t>/lib</a:t>
             </a:r>
             <a:r>
               <a:rPr lang="zh-CN" altLang="en-US" sz="2800" dirty="0"/>
@@ -6787,8 +6863,8 @@
         </p:nvSpPr>
         <p:spPr>
           <a:xfrm>
-            <a:off x="789940" y="1098550"/>
-            <a:ext cx="9110980" cy="368300"/>
+            <a:off x="789939" y="1098550"/>
+            <a:ext cx="9367851" cy="369332"/>
           </a:xfrm>
           <a:prstGeom prst="rect">
             <a:avLst/>
@@ -6807,7 +6883,7 @@
             </a:r>
             <a:r>
               <a:rPr lang="en-US" altLang="zh-CN" b="1" dirty="0"/>
-              <a:t>: - </a:t>
+              <a:t>: - @</a:t>
             </a:r>
             <a:r>
               <a:rPr lang="en-US" altLang="zh-CN" b="1" dirty="0" err="1">
@@ -6823,7 +6899,7 @@
                   <a:srgbClr val="FF0000"/>
                 </a:solidFill>
               </a:rPr>
-              <a:t>-lib</a:t>
+              <a:t>/lib</a:t>
             </a:r>
           </a:p>
         </p:txBody>
@@ -6855,6 +6931,10 @@
               <a:t>var jlib = require('</a:t>
             </a:r>
             <a:r>
+              <a:rPr lang="en-US" altLang="zh-CN" sz="1600" dirty="0"/>
+              <a:t>@</a:t>
+            </a:r>
+            <a:r>
               <a:rPr lang="en-US" altLang="zh-CN" sz="1600" dirty="0" err="1">
                 <a:solidFill>
                   <a:srgbClr val="FF0000"/>
@@ -6863,8 +6943,16 @@
               <a:t>swtc</a:t>
             </a:r>
             <a:r>
+              <a:rPr lang="en-US" altLang="zh-CN" sz="1600" dirty="0">
+                <a:solidFill>
+                  <a:srgbClr val="FF0000"/>
+                </a:solidFill>
+              </a:rPr>
+              <a:t>/</a:t>
+            </a:r>
+            <a:r>
               <a:rPr lang="zh-CN" altLang="en-US" sz="1600" dirty="0"/>
-              <a:t>-lib');</a:t>
+              <a:t>lib');</a:t>
             </a:r>
           </a:p>
           <a:p>
@@ -6890,7 +6978,7 @@
             </a:r>
             <a:r>
               <a:rPr lang="en-US" altLang="zh-CN" sz="1600" dirty="0"/>
-              <a:t>5020</a:t>
+              <a:t>5030</a:t>
             </a:r>
             <a:r>
               <a:rPr lang="zh-CN" altLang="en-US" sz="1600" dirty="0"/>
@@ -8070,6 +8158,10 @@
               <a:t>'</a:t>
             </a:r>
             <a:r>
+              <a:rPr lang="en-US" altLang="zh-CN" sz="1400" dirty="0"/>
+              <a:t>@</a:t>
+            </a:r>
+            <a:r>
               <a:rPr lang="en-US" altLang="zh-CN" sz="1400" dirty="0" err="1">
                 <a:solidFill>
                   <a:srgbClr val="FF0000"/>
@@ -8078,8 +8170,16 @@
               <a:t>swtc</a:t>
             </a:r>
             <a:r>
-              <a:rPr lang="en-US" altLang="zh-CN" sz="1400" dirty="0"/>
-              <a:t>-lib');</a:t>
+              <a:rPr lang="en-US" altLang="zh-CN" sz="1400" dirty="0">
+                <a:solidFill>
+                  <a:srgbClr val="FF0000"/>
+                </a:solidFill>
+              </a:rPr>
+              <a:t>/</a:t>
+            </a:r>
+            <a:r>
+              <a:rPr lang="en-US" altLang="zh-CN" sz="1400" dirty="0"/>
+              <a:t>lib');</a:t>
             </a:r>
           </a:p>
           <a:p>
@@ -8542,7 +8642,7 @@
             </a:r>
             <a:r>
               <a:rPr lang="en-US" altLang="zh-CN" b="1" dirty="0"/>
-              <a:t> – </a:t>
+              <a:t> – @</a:t>
             </a:r>
             <a:r>
               <a:rPr lang="en-US" altLang="zh-CN" b="1" dirty="0" err="1">
@@ -8558,7 +8658,7 @@
                   <a:srgbClr val="FF0000"/>
                 </a:solidFill>
               </a:rPr>
-              <a:t>-lib</a:t>
+              <a:t>/lib</a:t>
             </a:r>
             <a:endParaRPr lang="zh-CN" altLang="en-US" b="1" dirty="0">
               <a:solidFill>
@@ -9309,7 +9409,7 @@
             </a:r>
             <a:r>
               <a:rPr lang="en-US" altLang="zh-CN" sz="1400" dirty="0"/>
-              <a:t> = require('</a:t>
+              <a:t> = require('@</a:t>
             </a:r>
             <a:r>
               <a:rPr lang="en-US" altLang="zh-CN" sz="1400" dirty="0" err="1">
@@ -9320,8 +9420,16 @@
               <a:t>swtc</a:t>
             </a:r>
             <a:r>
-              <a:rPr lang="en-US" altLang="zh-CN" sz="1400" dirty="0"/>
-              <a:t>-lib');</a:t>
+              <a:rPr lang="en-US" altLang="zh-CN" sz="1400" dirty="0">
+                <a:solidFill>
+                  <a:srgbClr val="FF0000"/>
+                </a:solidFill>
+              </a:rPr>
+              <a:t>/</a:t>
+            </a:r>
+            <a:r>
+              <a:rPr lang="en-US" altLang="zh-CN" sz="1400" dirty="0"/>
+              <a:t>lib');</a:t>
             </a:r>
           </a:p>
           <a:p>
@@ -9625,7 +9733,7 @@
             </a:r>
             <a:r>
               <a:rPr lang="en-US" altLang="zh-CN" b="1" dirty="0"/>
-              <a:t> – </a:t>
+              <a:t> – @</a:t>
             </a:r>
             <a:r>
               <a:rPr lang="en-US" altLang="zh-CN" b="1" dirty="0" err="1">
@@ -9641,7 +9749,7 @@
                   <a:srgbClr val="FF0000"/>
                 </a:solidFill>
               </a:rPr>
-              <a:t>-lib</a:t>
+              <a:t>/lib</a:t>
             </a:r>
             <a:endParaRPr lang="zh-CN" altLang="en-US" b="1" dirty="0">
               <a:solidFill>
@@ -10399,7 +10507,7 @@
             </a:r>
             <a:r>
               <a:rPr lang="en-US" altLang="zh-CN" b="1" dirty="0"/>
-              <a:t> – </a:t>
+              <a:t> – @</a:t>
             </a:r>
             <a:r>
               <a:rPr lang="en-US" altLang="zh-CN" b="1" dirty="0" err="1">
@@ -10415,7 +10523,7 @@
                   <a:srgbClr val="FF0000"/>
                 </a:solidFill>
               </a:rPr>
-              <a:t>-lib</a:t>
+              <a:t>/lib</a:t>
             </a:r>
             <a:endParaRPr lang="zh-CN" altLang="en-US" b="1" dirty="0">
               <a:solidFill>
@@ -10452,6 +10560,10 @@
               <a:t>var jlib = require('</a:t>
             </a:r>
             <a:r>
+              <a:rPr lang="en-US" altLang="zh-CN" sz="1400" dirty="0"/>
+              <a:t>@</a:t>
+            </a:r>
+            <a:r>
               <a:rPr lang="en-US" altLang="zh-CN" sz="1400" dirty="0" err="1">
                 <a:solidFill>
                   <a:srgbClr val="FF0000"/>
@@ -10460,12 +10572,20 @@
               <a:t>swtc</a:t>
             </a:r>
             <a:r>
+              <a:rPr lang="en-US" altLang="zh-CN" sz="1400" dirty="0">
+                <a:solidFill>
+                  <a:srgbClr val="FF0000"/>
+                </a:solidFill>
+              </a:rPr>
+              <a:t>/</a:t>
+            </a:r>
+            <a:r>
               <a:rPr lang="zh-CN" altLang="en-US" sz="1400" dirty="0">
                 <a:solidFill>
                   <a:srgbClr val="FF0000"/>
                 </a:solidFill>
               </a:rPr>
-              <a:t>-lib</a:t>
+              <a:t>lib</a:t>
             </a:r>
             <a:r>
               <a:rPr lang="zh-CN" altLang="en-US" sz="1400" dirty="0"/>
@@ -11052,8 +11172,8 @@
         </p:nvSpPr>
         <p:spPr>
           <a:xfrm>
-            <a:off x="5148072" y="3813048"/>
-            <a:ext cx="3072384" cy="2062103"/>
+            <a:off x="5854149" y="3769713"/>
+            <a:ext cx="3747847" cy="2062103"/>
           </a:xfrm>
           <a:prstGeom prst="rect">
             <a:avLst/>
@@ -11134,8 +11254,21 @@
                   <a:srgbClr val="FF0000"/>
                 </a:solidFill>
               </a:rPr>
-              <a:t>…</a:t>
-            </a:r>
+              <a:t>proxy/</a:t>
+            </a:r>
+            <a:r>
+              <a:rPr lang="en-US" altLang="zh-CN" sz="3200" dirty="0" err="1">
+                <a:solidFill>
+                  <a:srgbClr val="FF0000"/>
+                </a:solidFill>
+              </a:rPr>
+              <a:t>api</a:t>
+            </a:r>
+            <a:endParaRPr lang="en-US" altLang="zh-CN" sz="3200" dirty="0">
+              <a:solidFill>
+                <a:srgbClr val="FF0000"/>
+              </a:solidFill>
+            </a:endParaRPr>
           </a:p>
         </p:txBody>
       </p:sp>
@@ -11167,7 +11300,7 @@
         </p:blipFill>
         <p:spPr>
           <a:xfrm>
-            <a:off x="8220456" y="3761928"/>
+            <a:off x="9144796" y="3721393"/>
             <a:ext cx="457200" cy="707886"/>
           </a:xfrm>
           <a:prstGeom prst="rect">
@@ -11203,7 +11336,7 @@
         </p:blipFill>
         <p:spPr>
           <a:xfrm>
-            <a:off x="8220456" y="4218375"/>
+            <a:off x="9144796" y="4243934"/>
             <a:ext cx="457200" cy="707886"/>
           </a:xfrm>
           <a:prstGeom prst="rect">
@@ -11239,7 +11372,7 @@
         </p:blipFill>
         <p:spPr>
           <a:xfrm>
-            <a:off x="8220456" y="4674822"/>
+            <a:off x="9144796" y="4674821"/>
             <a:ext cx="457200" cy="707886"/>
           </a:xfrm>
           <a:prstGeom prst="rect">
@@ -11804,7 +11937,7 @@
         <p:spPr>
           <a:xfrm>
             <a:off x="3622122" y="4178808"/>
-            <a:ext cx="4152099" cy="584775"/>
+            <a:ext cx="4491935" cy="584775"/>
           </a:xfrm>
           <a:prstGeom prst="rect">
             <a:avLst/>
@@ -11818,6 +11951,14 @@
           <a:lstStyle/>
           <a:p>
             <a:r>
+              <a:rPr lang="en-US" sz="3200" dirty="0">
+                <a:solidFill>
+                  <a:srgbClr val="FF0000"/>
+                </a:solidFill>
+              </a:rPr>
+              <a:t>@</a:t>
+            </a:r>
+            <a:r>
               <a:rPr lang="en-US" sz="3200" dirty="0" err="1">
                 <a:solidFill>
                   <a:srgbClr val="FF0000"/>
@@ -11831,7 +11972,7 @@
                   <a:srgbClr val="FF0000"/>
                 </a:solidFill>
               </a:rPr>
-              <a:t>-lib </a:t>
+              <a:t>/lib </a:t>
             </a:r>
             <a:r>
               <a:rPr lang="zh-CN" altLang="en-US" sz="3200" dirty="0">
@@ -12475,8 +12616,8 @@
         </p:nvSpPr>
         <p:spPr>
           <a:xfrm>
-            <a:off x="1176655" y="2105025"/>
-            <a:ext cx="7046595" cy="3693319"/>
+            <a:off x="1176655" y="2105024"/>
+            <a:ext cx="7589658" cy="3416320"/>
           </a:xfrm>
           <a:prstGeom prst="rect">
             <a:avLst/>
@@ -12504,23 +12645,31 @@
             </a:r>
             <a:r>
               <a:rPr lang="en-US" altLang="zh-CN" dirty="0"/>
+              <a:t> /v @</a:t>
+            </a:r>
+            <a:r>
+              <a:rPr lang="en-US" altLang="zh-CN" b="1" dirty="0" err="1">
+                <a:solidFill>
+                  <a:srgbClr val="FF0000"/>
+                </a:solidFill>
+              </a:rPr>
+              <a:t>swtc</a:t>
+            </a:r>
+            <a:r>
+              <a:rPr lang="en-US" altLang="zh-CN" b="1" dirty="0">
+                <a:solidFill>
+                  <a:srgbClr val="FF0000"/>
+                </a:solidFill>
+              </a:rPr>
               <a:t>/</a:t>
             </a:r>
             <a:r>
-              <a:rPr lang="en-US" altLang="zh-CN" b="1" dirty="0" err="1">
-                <a:solidFill>
-                  <a:srgbClr val="FF0000"/>
-                </a:solidFill>
-              </a:rPr>
-              <a:t>swtc</a:t>
-            </a:r>
-            <a:r>
               <a:rPr lang="en-US" altLang="zh-CN" dirty="0">
                 <a:solidFill>
                   <a:srgbClr val="FF0000"/>
                 </a:solidFill>
               </a:rPr>
-              <a:t>-lib</a:t>
+              <a:t>lib</a:t>
             </a:r>
             <a:r>
               <a:rPr lang="zh-CN" altLang="en-US" dirty="0"/>
@@ -12547,23 +12696,31 @@
             </a:r>
             <a:r>
               <a:rPr lang="en-US" altLang="zh-CN" dirty="0"/>
+              <a:t> / @</a:t>
+            </a:r>
+            <a:r>
+              <a:rPr lang="en-US" altLang="zh-CN" b="1" dirty="0" err="1">
+                <a:solidFill>
+                  <a:srgbClr val="FF0000"/>
+                </a:solidFill>
+              </a:rPr>
+              <a:t>swtc</a:t>
+            </a:r>
+            <a:r>
+              <a:rPr lang="en-US" altLang="zh-CN" b="1" dirty="0">
+                <a:solidFill>
+                  <a:srgbClr val="FF0000"/>
+                </a:solidFill>
+              </a:rPr>
               <a:t>/</a:t>
             </a:r>
             <a:r>
-              <a:rPr lang="en-US" altLang="zh-CN" b="1" dirty="0" err="1">
-                <a:solidFill>
-                  <a:srgbClr val="FF0000"/>
-                </a:solidFill>
-              </a:rPr>
-              <a:t>swtc</a:t>
-            </a:r>
-            <a:r>
               <a:rPr lang="en-US" altLang="zh-CN" dirty="0">
                 <a:solidFill>
                   <a:srgbClr val="FF0000"/>
                 </a:solidFill>
               </a:rPr>
-              <a:t>-lib</a:t>
+              <a:t>lib</a:t>
             </a:r>
             <a:r>
               <a:rPr lang="zh-CN" altLang="en-US" dirty="0"/>
@@ -12649,6 +12806,10 @@
               <a:t>方法提交数据，从而跟底层交互；</a:t>
             </a:r>
             <a:r>
+              <a:rPr lang="en-US" altLang="zh-CN" dirty="0"/>
+              <a:t>@</a:t>
+            </a:r>
+            <a:r>
               <a:rPr lang="en-US" altLang="zh-CN" dirty="0" err="1">
                 <a:solidFill>
                   <a:srgbClr val="FF0000"/>
@@ -12662,7 +12823,7 @@
                   <a:srgbClr val="FF0000"/>
                 </a:solidFill>
               </a:rPr>
-              <a:t>-lib</a:t>
+              <a:t>/lib</a:t>
             </a:r>
             <a:r>
               <a:rPr lang="zh-CN" altLang="en-US" dirty="0">
@@ -12745,7 +12906,7 @@
             </a:r>
             <a:r>
               <a:rPr lang="en-US" altLang="zh-CN" dirty="0"/>
-              <a:t>) </a:t>
+              <a:t>) @</a:t>
             </a:r>
             <a:r>
               <a:rPr lang="en-US" altLang="zh-CN" dirty="0" err="1">
@@ -12761,7 +12922,7 @@
                   <a:srgbClr val="FF0000"/>
                 </a:solidFill>
               </a:rPr>
-              <a:t>-lib</a:t>
+              <a:t>/lib</a:t>
             </a:r>
             <a:r>
               <a:rPr lang="zh-CN" altLang="en-US" dirty="0">
@@ -12967,12 +13128,20 @@
               <a:t>    npm install </a:t>
             </a:r>
             <a:r>
+              <a:rPr lang="en-US" altLang="zh-CN" dirty="0"/>
+              <a:t>@</a:t>
+            </a:r>
+            <a:r>
               <a:rPr lang="en-US" altLang="zh-CN" dirty="0" err="1"/>
               <a:t>swtc</a:t>
             </a:r>
             <a:r>
+              <a:rPr lang="en-US" altLang="zh-CN" dirty="0"/>
+              <a:t>/</a:t>
+            </a:r>
+            <a:r>
               <a:rPr lang="zh-CN" altLang="en-US" dirty="0"/>
-              <a:t>-lib</a:t>
+              <a:t>lib</a:t>
             </a:r>
           </a:p>
           <a:p>
@@ -13055,23 +13224,31 @@
                   <a:srgbClr val="FF0000"/>
                 </a:solidFill>
               </a:rPr>
+              <a:t>/@</a:t>
+            </a:r>
+            <a:r>
+              <a:rPr lang="en-US" altLang="zh-CN" dirty="0" err="1">
+                <a:solidFill>
+                  <a:srgbClr val="FF0000"/>
+                </a:solidFill>
+              </a:rPr>
+              <a:t>swtc</a:t>
+            </a:r>
+            <a:r>
+              <a:rPr lang="en-US" altLang="zh-CN" dirty="0">
+                <a:solidFill>
+                  <a:srgbClr val="FF0000"/>
+                </a:solidFill>
+              </a:rPr>
               <a:t>/</a:t>
             </a:r>
             <a:r>
-              <a:rPr lang="en-US" altLang="zh-CN" dirty="0" err="1">
-                <a:solidFill>
-                  <a:srgbClr val="FF0000"/>
-                </a:solidFill>
-              </a:rPr>
-              <a:t>swtc</a:t>
-            </a:r>
-            <a:r>
               <a:rPr lang="zh-CN" altLang="en-US" dirty="0">
                 <a:solidFill>
                   <a:srgbClr val="FF0000"/>
                 </a:solidFill>
               </a:rPr>
-              <a:t>-lib</a:t>
+              <a:t>lib</a:t>
             </a:r>
             <a:r>
               <a:rPr lang="zh-CN" altLang="en-US" dirty="0"/>
@@ -13309,7 +13486,15 @@
             <a:pPr algn="l"/>
             <a:r>
               <a:rPr lang="zh-CN" altLang="en-US" sz="1600" dirty="0"/>
-              <a:t>var remote = new Remote({server: 'ws://ts5.jingtum.com:5020'});</a:t>
+              <a:t>var remote = new Remote({server: 'ws://ts5.jingtum.com:50</a:t>
+            </a:r>
+            <a:r>
+              <a:rPr lang="en-US" altLang="zh-CN" sz="1600" dirty="0"/>
+              <a:t>3</a:t>
+            </a:r>
+            <a:r>
+              <a:rPr lang="zh-CN" altLang="en-US" sz="1600" dirty="0"/>
+              <a:t>0'});</a:t>
             </a:r>
           </a:p>
           <a:p>
@@ -13821,7 +14006,7 @@
             </a:r>
             <a:r>
               <a:rPr lang="en-US" altLang="zh-CN" sz="1600" dirty="0"/>
-              <a:t>'</a:t>
+              <a:t>'@</a:t>
             </a:r>
             <a:r>
               <a:rPr lang="en-US" altLang="zh-CN" sz="1600" dirty="0" err="1">
@@ -13832,8 +14017,16 @@
               <a:t>swtc</a:t>
             </a:r>
             <a:r>
+              <a:rPr lang="en-US" altLang="zh-CN" sz="1600" dirty="0">
+                <a:solidFill>
+                  <a:srgbClr val="FF0000"/>
+                </a:solidFill>
+              </a:rPr>
+              <a:t>/</a:t>
+            </a:r>
+            <a:r>
               <a:rPr lang="zh-CN" altLang="en-US" sz="1600" dirty="0"/>
-              <a:t>-lib');</a:t>
+              <a:t>lib');</a:t>
             </a:r>
           </a:p>
           <a:p>
@@ -13847,7 +14040,15 @@
             <a:pPr algn="l"/>
             <a:r>
               <a:rPr lang="zh-CN" altLang="en-US" sz="1600" dirty="0"/>
-              <a:t>var remote = new Remote({server: 'ws://ts5.jingtum.com:5020'});</a:t>
+              <a:t>var remote = new Remote({server: 'ws://ts5.jingtum.com:50</a:t>
+            </a:r>
+            <a:r>
+              <a:rPr lang="en-US" altLang="zh-CN" sz="1600" dirty="0"/>
+              <a:t>3</a:t>
+            </a:r>
+            <a:r>
+              <a:rPr lang="zh-CN" altLang="en-US" sz="1600" dirty="0"/>
+              <a:t>0'});</a:t>
             </a:r>
           </a:p>
           <a:p>
@@ -14091,7 +14292,7 @@
             </a:r>
             <a:r>
               <a:rPr lang="en-US" altLang="zh-CN" b="1" dirty="0"/>
-              <a:t> – </a:t>
+              <a:t> – @</a:t>
             </a:r>
             <a:r>
               <a:rPr lang="en-US" altLang="zh-CN" b="1" dirty="0" err="1">
@@ -14107,7 +14308,7 @@
                   <a:srgbClr val="FF0000"/>
                 </a:solidFill>
               </a:rPr>
-              <a:t>-lib</a:t>
+              <a:t>/lib</a:t>
             </a:r>
             <a:endParaRPr lang="zh-CN" altLang="en-US" b="1" dirty="0">
               <a:solidFill>

</xml_diff>